<commit_message>
Most of #154 is done. Just need the Start-to-quit, Add/Blend and Highlights
</commit_message>
<xml_diff>
--- a/Documentation/About-DC-and-Crayon.pptx
+++ b/Documentation/About-DC-and-Crayon.pptx
@@ -6183,7 +6183,7 @@
       </p:grpSpPr>
       <p:sp>
         <p:nvSpPr>
-          <p:cNvPr id="78" name="Rectangle 77">
+          <p:cNvPr id="83" name="Rectangle 82">
             <a:extLst>
               <a:ext uri="{FF2B5EF4-FFF2-40B4-BE49-F238E27FC236}">
                 <a16:creationId xmlns:a16="http://schemas.microsoft.com/office/drawing/2014/main" id="{867D4867-5BA7-4462-B2F6-A23F4A622AA7}"/>
@@ -6359,10 +6359,10 @@
       </p:sp>
       <p:pic>
         <p:nvPicPr>
-          <p:cNvPr id="3" name="Picture 2" descr="A picture containing object, clock&#10;&#10;Description automatically generated">
-            <a:extLst>
-              <a:ext uri="{FF2B5EF4-FFF2-40B4-BE49-F238E27FC236}">
-                <a16:creationId xmlns:a16="http://schemas.microsoft.com/office/drawing/2014/main" id="{53A63E10-5C35-448E-B3E9-3DD1A1249B6D}"/>
+          <p:cNvPr id="5" name="Picture 4" descr="A screen shot of a computer&#10;&#10;Description automatically generated">
+            <a:extLst>
+              <a:ext uri="{FF2B5EF4-FFF2-40B4-BE49-F238E27FC236}">
+                <a16:creationId xmlns:a16="http://schemas.microsoft.com/office/drawing/2014/main" id="{1675024F-8EBE-4B40-9E98-076D988676BC}"/>
               </a:ext>
             </a:extLst>
           </p:cNvPr>

</xml_diff>

<commit_message>
Slightly reworded a slide in pptx
</commit_message>
<xml_diff>
--- a/Documentation/About-DC-and-Crayon.pptx
+++ b/Documentation/About-DC-and-Crayon.pptx
@@ -277,7 +277,7 @@
           <a:p>
             <a:fld id="{A8B73DF2-13FE-4DEF-BC30-E7F6070018ED}" type="datetimeFigureOut">
               <a:rPr lang="en-AU" smtClean="0"/>
-              <a:t>25/09/2019</a:t>
+              <a:t>29/09/2019</a:t>
             </a:fld>
             <a:endParaRPr lang="en-AU"/>
           </a:p>
@@ -477,7 +477,7 @@
           <a:p>
             <a:fld id="{A8B73DF2-13FE-4DEF-BC30-E7F6070018ED}" type="datetimeFigureOut">
               <a:rPr lang="en-AU" smtClean="0"/>
-              <a:t>25/09/2019</a:t>
+              <a:t>29/09/2019</a:t>
             </a:fld>
             <a:endParaRPr lang="en-AU"/>
           </a:p>
@@ -687,7 +687,7 @@
           <a:p>
             <a:fld id="{A8B73DF2-13FE-4DEF-BC30-E7F6070018ED}" type="datetimeFigureOut">
               <a:rPr lang="en-AU" smtClean="0"/>
-              <a:t>25/09/2019</a:t>
+              <a:t>29/09/2019</a:t>
             </a:fld>
             <a:endParaRPr lang="en-AU"/>
           </a:p>
@@ -887,7 +887,7 @@
           <a:p>
             <a:fld id="{A8B73DF2-13FE-4DEF-BC30-E7F6070018ED}" type="datetimeFigureOut">
               <a:rPr lang="en-AU" smtClean="0"/>
-              <a:t>25/09/2019</a:t>
+              <a:t>29/09/2019</a:t>
             </a:fld>
             <a:endParaRPr lang="en-AU"/>
           </a:p>
@@ -1163,7 +1163,7 @@
           <a:p>
             <a:fld id="{A8B73DF2-13FE-4DEF-BC30-E7F6070018ED}" type="datetimeFigureOut">
               <a:rPr lang="en-AU" smtClean="0"/>
-              <a:t>25/09/2019</a:t>
+              <a:t>29/09/2019</a:t>
             </a:fld>
             <a:endParaRPr lang="en-AU"/>
           </a:p>
@@ -1431,7 +1431,7 @@
           <a:p>
             <a:fld id="{A8B73DF2-13FE-4DEF-BC30-E7F6070018ED}" type="datetimeFigureOut">
               <a:rPr lang="en-AU" smtClean="0"/>
-              <a:t>25/09/2019</a:t>
+              <a:t>29/09/2019</a:t>
             </a:fld>
             <a:endParaRPr lang="en-AU"/>
           </a:p>
@@ -1846,7 +1846,7 @@
           <a:p>
             <a:fld id="{A8B73DF2-13FE-4DEF-BC30-E7F6070018ED}" type="datetimeFigureOut">
               <a:rPr lang="en-AU" smtClean="0"/>
-              <a:t>25/09/2019</a:t>
+              <a:t>29/09/2019</a:t>
             </a:fld>
             <a:endParaRPr lang="en-AU"/>
           </a:p>
@@ -1988,7 +1988,7 @@
           <a:p>
             <a:fld id="{A8B73DF2-13FE-4DEF-BC30-E7F6070018ED}" type="datetimeFigureOut">
               <a:rPr lang="en-AU" smtClean="0"/>
-              <a:t>25/09/2019</a:t>
+              <a:t>29/09/2019</a:t>
             </a:fld>
             <a:endParaRPr lang="en-AU"/>
           </a:p>
@@ -2101,7 +2101,7 @@
           <a:p>
             <a:fld id="{A8B73DF2-13FE-4DEF-BC30-E7F6070018ED}" type="datetimeFigureOut">
               <a:rPr lang="en-AU" smtClean="0"/>
-              <a:t>25/09/2019</a:t>
+              <a:t>29/09/2019</a:t>
             </a:fld>
             <a:endParaRPr lang="en-AU"/>
           </a:p>
@@ -2414,7 +2414,7 @@
           <a:p>
             <a:fld id="{A8B73DF2-13FE-4DEF-BC30-E7F6070018ED}" type="datetimeFigureOut">
               <a:rPr lang="en-AU" smtClean="0"/>
-              <a:t>25/09/2019</a:t>
+              <a:t>29/09/2019</a:t>
             </a:fld>
             <a:endParaRPr lang="en-AU"/>
           </a:p>
@@ -2703,7 +2703,7 @@
           <a:p>
             <a:fld id="{A8B73DF2-13FE-4DEF-BC30-E7F6070018ED}" type="datetimeFigureOut">
               <a:rPr lang="en-AU" smtClean="0"/>
-              <a:t>25/09/2019</a:t>
+              <a:t>29/09/2019</a:t>
             </a:fld>
             <a:endParaRPr lang="en-AU"/>
           </a:p>
@@ -2946,7 +2946,7 @@
           <a:p>
             <a:fld id="{A8B73DF2-13FE-4DEF-BC30-E7F6070018ED}" type="datetimeFigureOut">
               <a:rPr lang="en-AU" smtClean="0"/>
-              <a:t>25/09/2019</a:t>
+              <a:t>29/09/2019</a:t>
             </a:fld>
             <a:endParaRPr lang="en-AU"/>
           </a:p>
@@ -3726,13 +3726,21 @@
           <a:p>
             <a:r>
               <a:rPr lang="en-AU" dirty="0"/>
-              <a:t>As mentioned before, the Dreamcast has a normal Joypad, there are some other kinds of controllers too</a:t>
-            </a:r>
-          </a:p>
-          <a:p>
+              <a:t>As mentioned before, the Dreamcast has a </a:t>
+            </a:r>
+            <a:r>
+              <a:rPr lang="en-AU"/>
+              <a:t>normal joypad controller</a:t>
+            </a:r>
             <a:r>
               <a:rPr lang="en-AU" dirty="0"/>
-              <a:t>Keyboard and Mouse, they work like PC ones, but aren’t as common	</a:t>
+              <a:t>, there are some other kinds of controllers too</a:t>
+            </a:r>
+          </a:p>
+          <a:p>
+            <a:r>
+              <a:rPr lang="en-AU" dirty="0"/>
+              <a:t>Keyboard and Mouse, they work like PC ones, but aren’t as common</a:t>
             </a:r>
           </a:p>
           <a:p>

</xml_diff>

<commit_message>
Starting to tidy-up the demo and updated relevant documentation
</commit_message>
<xml_diff>
--- a/Documentation/About-DC-and-Crayon.pptx
+++ b/Documentation/About-DC-and-Crayon.pptx
@@ -277,7 +277,7 @@
           <a:p>
             <a:fld id="{A8B73DF2-13FE-4DEF-BC30-E7F6070018ED}" type="datetimeFigureOut">
               <a:rPr lang="en-AU" smtClean="0"/>
-              <a:t>29/09/2019</a:t>
+              <a:t>7/10/2019</a:t>
             </a:fld>
             <a:endParaRPr lang="en-AU"/>
           </a:p>
@@ -477,7 +477,7 @@
           <a:p>
             <a:fld id="{A8B73DF2-13FE-4DEF-BC30-E7F6070018ED}" type="datetimeFigureOut">
               <a:rPr lang="en-AU" smtClean="0"/>
-              <a:t>29/09/2019</a:t>
+              <a:t>7/10/2019</a:t>
             </a:fld>
             <a:endParaRPr lang="en-AU"/>
           </a:p>
@@ -687,7 +687,7 @@
           <a:p>
             <a:fld id="{A8B73DF2-13FE-4DEF-BC30-E7F6070018ED}" type="datetimeFigureOut">
               <a:rPr lang="en-AU" smtClean="0"/>
-              <a:t>29/09/2019</a:t>
+              <a:t>7/10/2019</a:t>
             </a:fld>
             <a:endParaRPr lang="en-AU"/>
           </a:p>
@@ -887,7 +887,7 @@
           <a:p>
             <a:fld id="{A8B73DF2-13FE-4DEF-BC30-E7F6070018ED}" type="datetimeFigureOut">
               <a:rPr lang="en-AU" smtClean="0"/>
-              <a:t>29/09/2019</a:t>
+              <a:t>7/10/2019</a:t>
             </a:fld>
             <a:endParaRPr lang="en-AU"/>
           </a:p>
@@ -1163,7 +1163,7 @@
           <a:p>
             <a:fld id="{A8B73DF2-13FE-4DEF-BC30-E7F6070018ED}" type="datetimeFigureOut">
               <a:rPr lang="en-AU" smtClean="0"/>
-              <a:t>29/09/2019</a:t>
+              <a:t>7/10/2019</a:t>
             </a:fld>
             <a:endParaRPr lang="en-AU"/>
           </a:p>
@@ -1431,7 +1431,7 @@
           <a:p>
             <a:fld id="{A8B73DF2-13FE-4DEF-BC30-E7F6070018ED}" type="datetimeFigureOut">
               <a:rPr lang="en-AU" smtClean="0"/>
-              <a:t>29/09/2019</a:t>
+              <a:t>7/10/2019</a:t>
             </a:fld>
             <a:endParaRPr lang="en-AU"/>
           </a:p>
@@ -1846,7 +1846,7 @@
           <a:p>
             <a:fld id="{A8B73DF2-13FE-4DEF-BC30-E7F6070018ED}" type="datetimeFigureOut">
               <a:rPr lang="en-AU" smtClean="0"/>
-              <a:t>29/09/2019</a:t>
+              <a:t>7/10/2019</a:t>
             </a:fld>
             <a:endParaRPr lang="en-AU"/>
           </a:p>
@@ -1988,7 +1988,7 @@
           <a:p>
             <a:fld id="{A8B73DF2-13FE-4DEF-BC30-E7F6070018ED}" type="datetimeFigureOut">
               <a:rPr lang="en-AU" smtClean="0"/>
-              <a:t>29/09/2019</a:t>
+              <a:t>7/10/2019</a:t>
             </a:fld>
             <a:endParaRPr lang="en-AU"/>
           </a:p>
@@ -2101,7 +2101,7 @@
           <a:p>
             <a:fld id="{A8B73DF2-13FE-4DEF-BC30-E7F6070018ED}" type="datetimeFigureOut">
               <a:rPr lang="en-AU" smtClean="0"/>
-              <a:t>29/09/2019</a:t>
+              <a:t>7/10/2019</a:t>
             </a:fld>
             <a:endParaRPr lang="en-AU"/>
           </a:p>
@@ -2414,7 +2414,7 @@
           <a:p>
             <a:fld id="{A8B73DF2-13FE-4DEF-BC30-E7F6070018ED}" type="datetimeFigureOut">
               <a:rPr lang="en-AU" smtClean="0"/>
-              <a:t>29/09/2019</a:t>
+              <a:t>7/10/2019</a:t>
             </a:fld>
             <a:endParaRPr lang="en-AU"/>
           </a:p>
@@ -2703,7 +2703,7 @@
           <a:p>
             <a:fld id="{A8B73DF2-13FE-4DEF-BC30-E7F6070018ED}" type="datetimeFigureOut">
               <a:rPr lang="en-AU" smtClean="0"/>
-              <a:t>29/09/2019</a:t>
+              <a:t>7/10/2019</a:t>
             </a:fld>
             <a:endParaRPr lang="en-AU"/>
           </a:p>
@@ -2946,7 +2946,7 @@
           <a:p>
             <a:fld id="{A8B73DF2-13FE-4DEF-BC30-E7F6070018ED}" type="datetimeFigureOut">
               <a:rPr lang="en-AU" smtClean="0"/>
-              <a:t>29/09/2019</a:t>
+              <a:t>7/10/2019</a:t>
             </a:fld>
             <a:endParaRPr lang="en-AU"/>
           </a:p>
@@ -6268,7 +6268,7 @@
         </p:nvSpPr>
         <p:spPr>
           <a:xfrm>
-            <a:off x="643468" y="623392"/>
+            <a:off x="643468" y="517516"/>
             <a:ext cx="3363974" cy="1607060"/>
           </a:xfrm>
           <a:noFill/>
@@ -6310,8 +6310,8 @@
         </p:nvSpPr>
         <p:spPr>
           <a:xfrm>
-            <a:off x="643468" y="2638043"/>
-            <a:ext cx="3363974" cy="3415623"/>
+            <a:off x="643468" y="2532167"/>
+            <a:ext cx="3363974" cy="3596565"/>
           </a:xfrm>
         </p:spPr>
         <p:txBody>
@@ -6361,22 +6361,33 @@
             <a:pPr lvl="1"/>
             <a:r>
               <a:rPr lang="en-AU" sz="1300" dirty="0"/>
-              <a:t>Computers will use either OpenGL </a:t>
+              <a:t>Computers will use either OpenGL or Vulkan</a:t>
+            </a:r>
+          </a:p>
+          <a:p>
+            <a:r>
+              <a:rPr lang="en-AU" sz="1300" dirty="0"/>
+              <a:t>Still a WIP, some features like most </a:t>
             </a:r>
             <a:r>
               <a:rPr lang="en-AU" sz="1300"/>
-              <a:t>or Vulkan</a:t>
-            </a:r>
-            <a:endParaRPr lang="en-AU" sz="1300" dirty="0"/>
-          </a:p>
-          <a:p>
+              <a:t>of the Camera</a:t>
+            </a:r>
             <a:r>
               <a:rPr lang="en-AU" sz="1300" dirty="0"/>
-              <a:t>Still a WIP, some features like the “Camera” and </a:t>
+              <a:t>s</a:t>
+            </a:r>
+            <a:r>
+              <a:rPr lang="en-AU" sz="1300"/>
+              <a:t> </a:t>
+            </a:r>
+            <a:r>
+              <a:rPr lang="en-AU" sz="1300" dirty="0"/>
+              <a:t>and </a:t>
             </a:r>
             <a:r>
               <a:rPr lang="en-AU" sz="1300" dirty="0" err="1"/>
-              <a:t>fontstyles</a:t>
+              <a:t>Fontstyles</a:t>
             </a:r>
             <a:r>
               <a:rPr lang="en-AU" sz="1300" dirty="0"/>
@@ -6387,6 +6398,12 @@
             <a:r>
               <a:rPr lang="en-AU" sz="1300" dirty="0"/>
               <a:t>Can use it to make new projects</a:t>
+            </a:r>
+          </a:p>
+          <a:p>
+            <a:r>
+              <a:rPr lang="en-AU" sz="1300" dirty="0"/>
+              <a:t>Doesn’t support traditional lighting</a:t>
             </a:r>
           </a:p>
         </p:txBody>

</xml_diff>

<commit_message>
Updated the ppt to state sound-effect length calculation
</commit_message>
<xml_diff>
--- a/Documentation/About-DC-and-Crayon.pptx
+++ b/Documentation/About-DC-and-Crayon.pptx
@@ -277,7 +277,7 @@
           <a:p>
             <a:fld id="{A8B73DF2-13FE-4DEF-BC30-E7F6070018ED}" type="datetimeFigureOut">
               <a:rPr lang="en-AU" smtClean="0"/>
-              <a:t>7/10/2019</a:t>
+              <a:t>26/10/2019</a:t>
             </a:fld>
             <a:endParaRPr lang="en-AU"/>
           </a:p>
@@ -477,7 +477,7 @@
           <a:p>
             <a:fld id="{A8B73DF2-13FE-4DEF-BC30-E7F6070018ED}" type="datetimeFigureOut">
               <a:rPr lang="en-AU" smtClean="0"/>
-              <a:t>7/10/2019</a:t>
+              <a:t>26/10/2019</a:t>
             </a:fld>
             <a:endParaRPr lang="en-AU"/>
           </a:p>
@@ -687,7 +687,7 @@
           <a:p>
             <a:fld id="{A8B73DF2-13FE-4DEF-BC30-E7F6070018ED}" type="datetimeFigureOut">
               <a:rPr lang="en-AU" smtClean="0"/>
-              <a:t>7/10/2019</a:t>
+              <a:t>26/10/2019</a:t>
             </a:fld>
             <a:endParaRPr lang="en-AU"/>
           </a:p>
@@ -887,7 +887,7 @@
           <a:p>
             <a:fld id="{A8B73DF2-13FE-4DEF-BC30-E7F6070018ED}" type="datetimeFigureOut">
               <a:rPr lang="en-AU" smtClean="0"/>
-              <a:t>7/10/2019</a:t>
+              <a:t>26/10/2019</a:t>
             </a:fld>
             <a:endParaRPr lang="en-AU"/>
           </a:p>
@@ -1163,7 +1163,7 @@
           <a:p>
             <a:fld id="{A8B73DF2-13FE-4DEF-BC30-E7F6070018ED}" type="datetimeFigureOut">
               <a:rPr lang="en-AU" smtClean="0"/>
-              <a:t>7/10/2019</a:t>
+              <a:t>26/10/2019</a:t>
             </a:fld>
             <a:endParaRPr lang="en-AU"/>
           </a:p>
@@ -1431,7 +1431,7 @@
           <a:p>
             <a:fld id="{A8B73DF2-13FE-4DEF-BC30-E7F6070018ED}" type="datetimeFigureOut">
               <a:rPr lang="en-AU" smtClean="0"/>
-              <a:t>7/10/2019</a:t>
+              <a:t>26/10/2019</a:t>
             </a:fld>
             <a:endParaRPr lang="en-AU"/>
           </a:p>
@@ -1846,7 +1846,7 @@
           <a:p>
             <a:fld id="{A8B73DF2-13FE-4DEF-BC30-E7F6070018ED}" type="datetimeFigureOut">
               <a:rPr lang="en-AU" smtClean="0"/>
-              <a:t>7/10/2019</a:t>
+              <a:t>26/10/2019</a:t>
             </a:fld>
             <a:endParaRPr lang="en-AU"/>
           </a:p>
@@ -1988,7 +1988,7 @@
           <a:p>
             <a:fld id="{A8B73DF2-13FE-4DEF-BC30-E7F6070018ED}" type="datetimeFigureOut">
               <a:rPr lang="en-AU" smtClean="0"/>
-              <a:t>7/10/2019</a:t>
+              <a:t>26/10/2019</a:t>
             </a:fld>
             <a:endParaRPr lang="en-AU"/>
           </a:p>
@@ -2101,7 +2101,7 @@
           <a:p>
             <a:fld id="{A8B73DF2-13FE-4DEF-BC30-E7F6070018ED}" type="datetimeFigureOut">
               <a:rPr lang="en-AU" smtClean="0"/>
-              <a:t>7/10/2019</a:t>
+              <a:t>26/10/2019</a:t>
             </a:fld>
             <a:endParaRPr lang="en-AU"/>
           </a:p>
@@ -2414,7 +2414,7 @@
           <a:p>
             <a:fld id="{A8B73DF2-13FE-4DEF-BC30-E7F6070018ED}" type="datetimeFigureOut">
               <a:rPr lang="en-AU" smtClean="0"/>
-              <a:t>7/10/2019</a:t>
+              <a:t>26/10/2019</a:t>
             </a:fld>
             <a:endParaRPr lang="en-AU"/>
           </a:p>
@@ -2703,7 +2703,7 @@
           <a:p>
             <a:fld id="{A8B73DF2-13FE-4DEF-BC30-E7F6070018ED}" type="datetimeFigureOut">
               <a:rPr lang="en-AU" smtClean="0"/>
-              <a:t>7/10/2019</a:t>
+              <a:t>26/10/2019</a:t>
             </a:fld>
             <a:endParaRPr lang="en-AU"/>
           </a:p>
@@ -2946,7 +2946,7 @@
           <a:p>
             <a:fld id="{A8B73DF2-13FE-4DEF-BC30-E7F6070018ED}" type="datetimeFigureOut">
               <a:rPr lang="en-AU" smtClean="0"/>
-              <a:t>7/10/2019</a:t>
+              <a:t>26/10/2019</a:t>
             </a:fld>
             <a:endParaRPr lang="en-AU"/>
           </a:p>
@@ -3622,16 +3622,13 @@
             <a:pPr lvl="1"/>
             <a:r>
               <a:rPr lang="en-AU" dirty="0"/>
-              <a:t>Depending on what format is chosen, sound effects have a max length </a:t>
-            </a:r>
-            <a:r>
-              <a:rPr lang="en-AU" dirty="0">
-                <a:solidFill>
-                  <a:srgbClr val="FF0000"/>
-                </a:solidFill>
-              </a:rPr>
-              <a:t>(*)</a:t>
-            </a:r>
+              <a:t>Depending on what format is chosen, sound effects have a max length. I believe this is 65535 Samples / Sample-Rate</a:t>
+            </a:r>
+            <a:endParaRPr lang="en-AU" dirty="0">
+              <a:solidFill>
+                <a:srgbClr val="FF0000"/>
+              </a:solidFill>
+            </a:endParaRPr>
           </a:p>
           <a:p>
             <a:r>

</xml_diff>